<commit_message>
update to the presentation
</commit_message>
<xml_diff>
--- a/Thesis/MUSE_Defense_presentation.pptx
+++ b/Thesis/MUSE_Defense_presentation.pptx
@@ -1,6 +1,6 @@
 
 <file path=ppt/presentation.xml><?xml version="1.0" encoding="utf-8"?>
-<p:presentation xmlns:a="http://schemas.openxmlformats.org/drawingml/2006/main" xmlns:r="http://schemas.openxmlformats.org/officeDocument/2006/relationships" xmlns:p="http://schemas.openxmlformats.org/presentationml/2006/main" saveSubsetFonts="1">
+<p:presentation xmlns:a="http://schemas.openxmlformats.org/drawingml/2006/main" xmlns:r="http://schemas.openxmlformats.org/officeDocument/2006/relationships" xmlns:p="http://schemas.openxmlformats.org/presentationml/2006/main" saveSubsetFonts="1" bookmarkIdSeed="3">
   <p:sldMasterIdLst>
     <p:sldMasterId id="2147483768" r:id="rId1"/>
   </p:sldMasterIdLst>
@@ -10,11 +10,13 @@
     <p:sldId id="258" r:id="rId4"/>
     <p:sldId id="259" r:id="rId5"/>
     <p:sldId id="260" r:id="rId6"/>
-    <p:sldId id="261" r:id="rId7"/>
-    <p:sldId id="262" r:id="rId8"/>
-    <p:sldId id="263" r:id="rId9"/>
-    <p:sldId id="264" r:id="rId10"/>
-    <p:sldId id="265" r:id="rId11"/>
+    <p:sldId id="266" r:id="rId7"/>
+    <p:sldId id="267" r:id="rId8"/>
+    <p:sldId id="264" r:id="rId9"/>
+    <p:sldId id="270" r:id="rId10"/>
+    <p:sldId id="263" r:id="rId11"/>
+    <p:sldId id="265" r:id="rId12"/>
+    <p:sldId id="268" r:id="rId13"/>
   </p:sldIdLst>
   <p:sldSz cx="9144000" cy="6858000" type="screen4x3"/>
   <p:notesSz cx="6858000" cy="9144000"/>
@@ -741,7 +743,8 @@
           <a:p>
             <a:fld id="{74E85FBA-655E-485D-8443-23493E4B9167}" type="datetimeFigureOut">
               <a:rPr lang="en-US" smtClean="0"/>
-              <a:t>5/17/2009</a:t>
+              <a:pPr/>
+              <a:t>5/19/2009</a:t>
             </a:fld>
             <a:endParaRPr lang="en-US"/>
           </a:p>
@@ -803,6 +806,7 @@
           <a:p>
             <a:fld id="{D6A100D4-B048-4293-BE73-AFD2505348F7}" type="slidenum">
               <a:rPr lang="en-US" smtClean="0"/>
+              <a:pPr/>
               <a:t>‹#›</a:t>
             </a:fld>
             <a:endParaRPr lang="en-US"/>
@@ -937,7 +941,8 @@
           <a:p>
             <a:fld id="{74E85FBA-655E-485D-8443-23493E4B9167}" type="datetimeFigureOut">
               <a:rPr lang="en-US" smtClean="0"/>
-              <a:t>5/17/2009</a:t>
+              <a:pPr/>
+              <a:t>5/19/2009</a:t>
             </a:fld>
             <a:endParaRPr lang="en-US"/>
           </a:p>
@@ -983,6 +988,7 @@
           <a:p>
             <a:fld id="{D6A100D4-B048-4293-BE73-AFD2505348F7}" type="slidenum">
               <a:rPr lang="en-US" smtClean="0"/>
+              <a:pPr/>
               <a:t>‹#›</a:t>
             </a:fld>
             <a:endParaRPr lang="en-US"/>
@@ -1122,7 +1128,8 @@
           <a:p>
             <a:fld id="{74E85FBA-655E-485D-8443-23493E4B9167}" type="datetimeFigureOut">
               <a:rPr lang="en-US" smtClean="0"/>
-              <a:t>5/17/2009</a:t>
+              <a:pPr/>
+              <a:t>5/19/2009</a:t>
             </a:fld>
             <a:endParaRPr lang="en-US"/>
           </a:p>
@@ -1168,6 +1175,7 @@
           <a:p>
             <a:fld id="{D6A100D4-B048-4293-BE73-AFD2505348F7}" type="slidenum">
               <a:rPr lang="en-US" smtClean="0"/>
+              <a:pPr/>
               <a:t>‹#›</a:t>
             </a:fld>
             <a:endParaRPr lang="en-US"/>
@@ -1272,7 +1280,8 @@
           <a:p>
             <a:fld id="{74E85FBA-655E-485D-8443-23493E4B9167}" type="datetimeFigureOut">
               <a:rPr lang="en-US" smtClean="0"/>
-              <a:t>5/17/2009</a:t>
+              <a:pPr/>
+              <a:t>5/19/2009</a:t>
             </a:fld>
             <a:endParaRPr lang="en-US"/>
           </a:p>
@@ -1318,6 +1327,7 @@
           <a:p>
             <a:fld id="{D6A100D4-B048-4293-BE73-AFD2505348F7}" type="slidenum">
               <a:rPr lang="en-US" smtClean="0"/>
+              <a:pPr/>
               <a:t>‹#›</a:t>
             </a:fld>
             <a:endParaRPr lang="en-US"/>
@@ -1527,7 +1537,8 @@
           <a:p>
             <a:fld id="{74E85FBA-655E-485D-8443-23493E4B9167}" type="datetimeFigureOut">
               <a:rPr lang="en-US" smtClean="0"/>
-              <a:t>5/17/2009</a:t>
+              <a:pPr/>
+              <a:t>5/19/2009</a:t>
             </a:fld>
             <a:endParaRPr lang="en-US"/>
           </a:p>
@@ -1573,6 +1584,7 @@
           <a:p>
             <a:fld id="{D6A100D4-B048-4293-BE73-AFD2505348F7}" type="slidenum">
               <a:rPr lang="en-US" smtClean="0"/>
+              <a:pPr/>
               <a:t>‹#›</a:t>
             </a:fld>
             <a:endParaRPr lang="en-US"/>
@@ -1936,7 +1948,8 @@
           <a:p>
             <a:fld id="{74E85FBA-655E-485D-8443-23493E4B9167}" type="datetimeFigureOut">
               <a:rPr lang="en-US" smtClean="0"/>
-              <a:t>5/17/2009</a:t>
+              <a:pPr/>
+              <a:t>5/19/2009</a:t>
             </a:fld>
             <a:endParaRPr lang="en-US"/>
           </a:p>
@@ -1982,6 +1995,7 @@
           <a:p>
             <a:fld id="{D6A100D4-B048-4293-BE73-AFD2505348F7}" type="slidenum">
               <a:rPr lang="en-US" smtClean="0"/>
+              <a:pPr/>
               <a:t>‹#›</a:t>
             </a:fld>
             <a:endParaRPr lang="en-US"/>
@@ -2382,7 +2396,8 @@
           <a:p>
             <a:fld id="{74E85FBA-655E-485D-8443-23493E4B9167}" type="datetimeFigureOut">
               <a:rPr lang="en-US" smtClean="0"/>
-              <a:t>5/17/2009</a:t>
+              <a:pPr/>
+              <a:t>5/19/2009</a:t>
             </a:fld>
             <a:endParaRPr lang="en-US"/>
           </a:p>
@@ -2428,6 +2443,7 @@
           <a:p>
             <a:fld id="{D6A100D4-B048-4293-BE73-AFD2505348F7}" type="slidenum">
               <a:rPr lang="en-US" smtClean="0"/>
+              <a:pPr/>
               <a:t>‹#›</a:t>
             </a:fld>
             <a:endParaRPr lang="en-US"/>
@@ -2483,7 +2499,8 @@
           <a:p>
             <a:fld id="{74E85FBA-655E-485D-8443-23493E4B9167}" type="datetimeFigureOut">
               <a:rPr lang="en-US" smtClean="0"/>
-              <a:t>5/17/2009</a:t>
+              <a:pPr/>
+              <a:t>5/19/2009</a:t>
             </a:fld>
             <a:endParaRPr lang="en-US"/>
           </a:p>
@@ -2529,6 +2546,7 @@
           <a:p>
             <a:fld id="{D6A100D4-B048-4293-BE73-AFD2505348F7}" type="slidenum">
               <a:rPr lang="en-US" smtClean="0"/>
+              <a:pPr/>
               <a:t>‹#›</a:t>
             </a:fld>
             <a:endParaRPr lang="en-US"/>
@@ -2604,7 +2622,8 @@
           <a:p>
             <a:fld id="{74E85FBA-655E-485D-8443-23493E4B9167}" type="datetimeFigureOut">
               <a:rPr lang="en-US" smtClean="0"/>
-              <a:t>5/17/2009</a:t>
+              <a:pPr/>
+              <a:t>5/19/2009</a:t>
             </a:fld>
             <a:endParaRPr lang="en-US"/>
           </a:p>
@@ -2650,6 +2669,7 @@
           <a:p>
             <a:fld id="{D6A100D4-B048-4293-BE73-AFD2505348F7}" type="slidenum">
               <a:rPr lang="en-US" smtClean="0"/>
+              <a:pPr/>
               <a:t>‹#›</a:t>
             </a:fld>
             <a:endParaRPr lang="en-US"/>
@@ -2878,7 +2898,8 @@
           <a:p>
             <a:fld id="{74E85FBA-655E-485D-8443-23493E4B9167}" type="datetimeFigureOut">
               <a:rPr lang="en-US" smtClean="0"/>
-              <a:t>5/17/2009</a:t>
+              <a:pPr/>
+              <a:t>5/19/2009</a:t>
             </a:fld>
             <a:endParaRPr lang="en-US"/>
           </a:p>
@@ -2924,6 +2945,7 @@
           <a:p>
             <a:fld id="{D6A100D4-B048-4293-BE73-AFD2505348F7}" type="slidenum">
               <a:rPr lang="en-US" smtClean="0"/>
+              <a:pPr/>
               <a:t>‹#›</a:t>
             </a:fld>
             <a:endParaRPr lang="en-US"/>
@@ -3083,7 +3105,8 @@
           <a:p>
             <a:fld id="{74E85FBA-655E-485D-8443-23493E4B9167}" type="datetimeFigureOut">
               <a:rPr lang="en-US" smtClean="0"/>
-              <a:t>5/17/2009</a:t>
+              <a:pPr/>
+              <a:t>5/19/2009</a:t>
             </a:fld>
             <a:endParaRPr lang="en-US"/>
           </a:p>
@@ -3148,6 +3171,7 @@
           <a:p>
             <a:fld id="{D6A100D4-B048-4293-BE73-AFD2505348F7}" type="slidenum">
               <a:rPr lang="en-US" smtClean="0"/>
+              <a:pPr/>
               <a:t>‹#›</a:t>
             </a:fld>
             <a:endParaRPr lang="en-US"/>
@@ -4192,7 +4216,8 @@
           <a:p>
             <a:fld id="{74E85FBA-655E-485D-8443-23493E4B9167}" type="datetimeFigureOut">
               <a:rPr lang="en-US" smtClean="0"/>
-              <a:t>5/17/2009</a:t>
+              <a:pPr/>
+              <a:t>5/19/2009</a:t>
             </a:fld>
             <a:endParaRPr lang="en-US"/>
           </a:p>
@@ -4268,6 +4293,7 @@
           <a:p>
             <a:fld id="{D6A100D4-B048-4293-BE73-AFD2505348F7}" type="slidenum">
               <a:rPr lang="en-US" smtClean="0"/>
+              <a:pPr/>
               <a:t>‹#›</a:t>
             </a:fld>
             <a:endParaRPr lang="en-US"/>
@@ -4749,15 +4775,19 @@
             </a:br>
             <a:r>
               <a:rPr smtClean="0"/>
-              <a:t>MUSE</a:t>
-            </a:r>
-            <a:r>
-              <a:rPr smtClean="0"/>
-              <a:t>: </a:t>
+              <a:t>MUSE: </a:t>
             </a:r>
             <a:r>
               <a:rPr sz="4900" smtClean="0"/>
-              <a:t>A parallel Agent-based Simulation Environment</a:t>
+              <a:t>A </a:t>
+            </a:r>
+            <a:r>
+              <a:rPr sz="4900" smtClean="0"/>
+              <a:t>parallel </a:t>
+            </a:r>
+            <a:r>
+              <a:rPr sz="4900" smtClean="0"/>
+              <a:t>Agent-based Simulation Environment</a:t>
             </a:r>
             <a:r>
               <a:rPr smtClean="0"/>
@@ -4798,15 +4828,7 @@
           <a:p>
             <a:r>
               <a:rPr lang="en-US" dirty="0" smtClean="0"/>
-              <a:t>Advisor: Dr. </a:t>
-            </a:r>
-            <a:r>
-              <a:rPr lang="en-US" dirty="0" err="1" smtClean="0"/>
-              <a:t>Dhananjai</a:t>
-            </a:r>
-            <a:r>
-              <a:rPr lang="en-US" dirty="0" smtClean="0"/>
-              <a:t> M. Rao</a:t>
+              <a:t>Advisor: Dr. Dhananjai M. Rao</a:t>
             </a:r>
           </a:p>
           <a:p>
@@ -4880,22 +4902,20 @@
         </p:nvSpPr>
         <p:spPr/>
         <p:txBody>
-          <a:bodyPr/>
+          <a:bodyPr>
+            <a:normAutofit/>
+          </a:bodyPr>
           <a:lstStyle/>
           <a:p>
             <a:r>
               <a:rPr lang="en-US" sz="3000" dirty="0" smtClean="0"/>
-              <a:t>Conclusion and Future Works</a:t>
-            </a:r>
-            <a:r>
-              <a:rPr lang="en-US" sz="1800" dirty="0" smtClean="0"/>
-              <a:t>(1/3</a:t>
-            </a:r>
-            <a:r>
-              <a:rPr lang="en-US" sz="1800" dirty="0" smtClean="0"/>
-              <a:t>)</a:t>
-            </a:r>
-            <a:endParaRPr lang="en-US" dirty="0"/>
+              <a:t>MUSE Public API</a:t>
+            </a:r>
+            <a:r>
+              <a:rPr lang="en-US" sz="1200" dirty="0" smtClean="0"/>
+              <a:t>(1/10)</a:t>
+            </a:r>
+            <a:endParaRPr lang="en-US" sz="3000" dirty="0"/>
           </a:p>
         </p:txBody>
       </p:sp>
@@ -4904,6 +4924,227 @@
   <p:clrMapOvr>
     <a:masterClrMapping/>
   </p:clrMapOvr>
+  <p:timing>
+    <p:tnLst>
+      <p:par>
+        <p:cTn id="1" dur="indefinite" restart="never" nodeType="tmRoot"/>
+      </p:par>
+    </p:tnLst>
+  </p:timing>
+</p:sld>
+</file>
+
+<file path=ppt/slides/slide11.xml><?xml version="1.0" encoding="utf-8"?>
+<p:sld xmlns:a="http://schemas.openxmlformats.org/drawingml/2006/main" xmlns:r="http://schemas.openxmlformats.org/officeDocument/2006/relationships" xmlns:p="http://schemas.openxmlformats.org/presentationml/2006/main">
+  <p:cSld>
+    <p:spTree>
+      <p:nvGrpSpPr>
+        <p:cNvPr id="1" name=""/>
+        <p:cNvGrpSpPr/>
+        <p:nvPr/>
+      </p:nvGrpSpPr>
+      <p:grpSpPr>
+        <a:xfrm>
+          <a:off x="0" y="0"/>
+          <a:ext cx="0" cy="0"/>
+          <a:chOff x="0" y="0"/>
+          <a:chExt cx="0" cy="0"/>
+        </a:xfrm>
+      </p:grpSpPr>
+      <p:sp>
+        <p:nvSpPr>
+          <p:cNvPr id="2" name="Content Placeholder 1"/>
+          <p:cNvSpPr>
+            <a:spLocks noGrp="1"/>
+          </p:cNvSpPr>
+          <p:nvPr>
+            <p:ph idx="1"/>
+          </p:nvPr>
+        </p:nvSpPr>
+        <p:spPr/>
+        <p:txBody>
+          <a:bodyPr>
+            <a:normAutofit/>
+          </a:bodyPr>
+          <a:lstStyle/>
+          <a:p>
+            <a:r>
+              <a:rPr lang="en-US" sz="1700" dirty="0" smtClean="0"/>
+              <a:t>2D/3D </a:t>
+            </a:r>
+            <a:r>
+              <a:rPr lang="en-US" sz="1700" dirty="0" smtClean="0"/>
+              <a:t>Visualization API</a:t>
+            </a:r>
+          </a:p>
+          <a:p>
+            <a:pPr>
+              <a:buNone/>
+            </a:pPr>
+            <a:endParaRPr lang="en-US" sz="1700" dirty="0" smtClean="0"/>
+          </a:p>
+          <a:p>
+            <a:r>
+              <a:rPr lang="en-US" sz="1700" dirty="0" smtClean="0"/>
+              <a:t>Spatial aware Agents API</a:t>
+            </a:r>
+          </a:p>
+          <a:p>
+            <a:pPr>
+              <a:buNone/>
+            </a:pPr>
+            <a:endParaRPr lang="en-US" sz="1700" dirty="0" smtClean="0"/>
+          </a:p>
+          <a:p>
+            <a:r>
+              <a:rPr lang="en-US" sz="1700" dirty="0" smtClean="0"/>
+              <a:t>Adapt MUSE to take advantage of Cloud Computing.</a:t>
+            </a:r>
+          </a:p>
+          <a:p>
+            <a:pPr lvl="1"/>
+            <a:r>
+              <a:rPr lang="en-US" sz="1400" dirty="0" smtClean="0"/>
+              <a:t>We are currently looking into this possibility</a:t>
+            </a:r>
+            <a:r>
+              <a:rPr lang="en-US" sz="1400" dirty="0" smtClean="0"/>
+              <a:t>.</a:t>
+            </a:r>
+          </a:p>
+          <a:p>
+            <a:pPr lvl="1">
+              <a:buNone/>
+            </a:pPr>
+            <a:endParaRPr lang="en-US" sz="1300" dirty="0" smtClean="0"/>
+          </a:p>
+          <a:p>
+            <a:r>
+              <a:rPr lang="en-US" sz="1700" dirty="0" smtClean="0"/>
+              <a:t>Adapt MUSE to work with grid computing.</a:t>
+            </a:r>
+            <a:r>
+              <a:rPr lang="en-US" sz="1700" dirty="0" smtClean="0"/>
+              <a:t> </a:t>
+            </a:r>
+            <a:endParaRPr lang="en-US" sz="1700" dirty="0"/>
+          </a:p>
+        </p:txBody>
+      </p:sp>
+      <p:sp>
+        <p:nvSpPr>
+          <p:cNvPr id="3" name="Title 2"/>
+          <p:cNvSpPr>
+            <a:spLocks noGrp="1"/>
+          </p:cNvSpPr>
+          <p:nvPr>
+            <p:ph type="title"/>
+          </p:nvPr>
+        </p:nvSpPr>
+        <p:spPr/>
+        <p:txBody>
+          <a:bodyPr/>
+          <a:lstStyle/>
+          <a:p>
+            <a:r>
+              <a:rPr lang="en-US" sz="3000" dirty="0" smtClean="0"/>
+              <a:t>Conclusion and Future Works</a:t>
+            </a:r>
+            <a:r>
+              <a:rPr lang="en-US" sz="1800" dirty="0" smtClean="0"/>
+              <a:t>(1/3)</a:t>
+            </a:r>
+            <a:endParaRPr lang="en-US" dirty="0"/>
+          </a:p>
+        </p:txBody>
+      </p:sp>
+    </p:spTree>
+  </p:cSld>
+  <p:clrMapOvr>
+    <a:masterClrMapping/>
+  </p:clrMapOvr>
+  <p:timing>
+    <p:tnLst>
+      <p:par>
+        <p:cTn id="1" dur="indefinite" restart="never" nodeType="tmRoot"/>
+      </p:par>
+    </p:tnLst>
+  </p:timing>
+</p:sld>
+</file>
+
+<file path=ppt/slides/slide12.xml><?xml version="1.0" encoding="utf-8"?>
+<p:sld xmlns:a="http://schemas.openxmlformats.org/drawingml/2006/main" xmlns:r="http://schemas.openxmlformats.org/officeDocument/2006/relationships" xmlns:p="http://schemas.openxmlformats.org/presentationml/2006/main">
+  <p:cSld>
+    <p:spTree>
+      <p:nvGrpSpPr>
+        <p:cNvPr id="1" name=""/>
+        <p:cNvGrpSpPr/>
+        <p:nvPr/>
+      </p:nvGrpSpPr>
+      <p:grpSpPr>
+        <a:xfrm>
+          <a:off x="0" y="0"/>
+          <a:ext cx="0" cy="0"/>
+          <a:chOff x="0" y="0"/>
+          <a:chExt cx="0" cy="0"/>
+        </a:xfrm>
+      </p:grpSpPr>
+      <p:sp>
+        <p:nvSpPr>
+          <p:cNvPr id="2" name="Content Placeholder 1"/>
+          <p:cNvSpPr>
+            <a:spLocks noGrp="1"/>
+          </p:cNvSpPr>
+          <p:nvPr>
+            <p:ph idx="1"/>
+          </p:nvPr>
+        </p:nvSpPr>
+        <p:spPr/>
+        <p:txBody>
+          <a:bodyPr/>
+          <a:lstStyle/>
+          <a:p>
+            <a:endParaRPr lang="en-US" dirty="0"/>
+          </a:p>
+        </p:txBody>
+      </p:sp>
+      <p:sp>
+        <p:nvSpPr>
+          <p:cNvPr id="3" name="Title 2"/>
+          <p:cNvSpPr>
+            <a:spLocks noGrp="1"/>
+          </p:cNvSpPr>
+          <p:nvPr>
+            <p:ph type="title"/>
+          </p:nvPr>
+        </p:nvSpPr>
+        <p:spPr/>
+        <p:txBody>
+          <a:bodyPr/>
+          <a:lstStyle/>
+          <a:p>
+            <a:pPr algn="ctr"/>
+            <a:r>
+              <a:rPr lang="en-US" dirty="0" smtClean="0"/>
+              <a:t>QUESTIONS</a:t>
+            </a:r>
+            <a:endParaRPr lang="en-US" dirty="0"/>
+          </a:p>
+        </p:txBody>
+      </p:sp>
+    </p:spTree>
+  </p:cSld>
+  <p:clrMapOvr>
+    <a:masterClrMapping/>
+  </p:clrMapOvr>
+  <p:timing>
+    <p:tnLst>
+      <p:par>
+        <p:cTn id="1" dur="indefinite" restart="never" nodeType="tmRoot"/>
+      </p:par>
+    </p:tnLst>
+  </p:timing>
 </p:sld>
 </file>
 
@@ -4936,52 +5177,69 @@
         </p:nvSpPr>
         <p:spPr/>
         <p:txBody>
-          <a:bodyPr/>
+          <a:bodyPr>
+            <a:normAutofit/>
+          </a:bodyPr>
           <a:lstStyle/>
           <a:p>
             <a:r>
-              <a:rPr lang="en-US" dirty="0" smtClean="0"/>
+              <a:rPr lang="en-US" sz="1700" dirty="0" smtClean="0"/>
               <a:t>Motivation</a:t>
             </a:r>
           </a:p>
           <a:p>
-            <a:r>
-              <a:rPr lang="en-US" dirty="0" smtClean="0"/>
-              <a:t>Background and Relate works</a:t>
-            </a:r>
-          </a:p>
-          <a:p>
-            <a:r>
-              <a:rPr lang="en-US" dirty="0" smtClean="0"/>
-              <a:t>Muse Design </a:t>
-            </a:r>
-            <a:r>
-              <a:rPr lang="en-US" dirty="0" smtClean="0"/>
-              <a:t>D</a:t>
-            </a:r>
-            <a:r>
-              <a:rPr lang="en-US" dirty="0" smtClean="0"/>
-              <a:t>etails</a:t>
-            </a:r>
-          </a:p>
-          <a:p>
-            <a:r>
-              <a:rPr lang="en-US" dirty="0" smtClean="0"/>
-              <a:t>MUSE Public API</a:t>
-            </a:r>
-          </a:p>
-          <a:p>
-            <a:r>
-              <a:rPr lang="en-US" dirty="0" smtClean="0"/>
-              <a:t>Empirical Evaluation and Benchmarking</a:t>
-            </a:r>
-          </a:p>
-          <a:p>
-            <a:r>
-              <a:rPr lang="en-US" dirty="0" smtClean="0"/>
+            <a:endParaRPr lang="en-US" sz="1700" dirty="0" smtClean="0"/>
+          </a:p>
+          <a:p>
+            <a:r>
+              <a:rPr lang="en-US" sz="1700" dirty="0" smtClean="0"/>
+              <a:t>What is Agent-based modeling (ABM)</a:t>
+            </a:r>
+          </a:p>
+          <a:p>
+            <a:endParaRPr lang="en-US" sz="1700" dirty="0" smtClean="0"/>
+          </a:p>
+          <a:p>
+            <a:r>
+              <a:rPr lang="en-US" sz="1700" dirty="0" smtClean="0"/>
+              <a:t>Advantages of ABM</a:t>
+            </a:r>
+          </a:p>
+          <a:p>
+            <a:endParaRPr lang="en-US" sz="1700" dirty="0" smtClean="0"/>
+          </a:p>
+          <a:p>
+            <a:r>
+              <a:rPr lang="en-US" sz="1700" dirty="0" smtClean="0"/>
+              <a:t>Empirical Evaluation and </a:t>
+            </a:r>
+            <a:r>
+              <a:rPr lang="en-US" sz="1700" dirty="0" smtClean="0"/>
+              <a:t>Benchmarking results</a:t>
+            </a:r>
+          </a:p>
+          <a:p>
+            <a:endParaRPr lang="en-US" sz="1700" dirty="0" smtClean="0"/>
+          </a:p>
+          <a:p>
+            <a:r>
+              <a:rPr lang="en-US" sz="1700" dirty="0" smtClean="0"/>
+              <a:t>MUSE Public </a:t>
+            </a:r>
+            <a:r>
+              <a:rPr lang="en-US" sz="1700" dirty="0" smtClean="0"/>
+              <a:t>API</a:t>
+            </a:r>
+          </a:p>
+          <a:p>
+            <a:endParaRPr lang="en-US" sz="1700" dirty="0" smtClean="0"/>
+          </a:p>
+          <a:p>
+            <a:r>
+              <a:rPr lang="en-US" sz="1700" dirty="0" smtClean="0"/>
               <a:t>Conclusion and Future Works</a:t>
             </a:r>
-            <a:endParaRPr lang="en-US" dirty="0"/>
+            <a:endParaRPr lang="en-US" sz="1700" dirty="0"/>
           </a:p>
         </p:txBody>
       </p:sp>
@@ -5065,63 +5323,41 @@
               <a:rPr lang="en-US" sz="1700" dirty="0" smtClean="0"/>
               <a:t>Research and development of modern systems consume countless man hours and money. </a:t>
             </a:r>
+          </a:p>
+          <a:p>
             <a:endParaRPr lang="en-US" sz="1700" dirty="0" smtClean="0"/>
           </a:p>
           <a:p>
             <a:endParaRPr lang="en-US" sz="1700" dirty="0" smtClean="0"/>
           </a:p>
           <a:p>
+            <a:r>
+              <a:rPr lang="en-US" sz="1700" dirty="0" smtClean="0"/>
+              <a:t>Maximizing the output of any system requires plenty of study, which will yield effective procedures to design, develop, and maintain them. </a:t>
+            </a:r>
+          </a:p>
+          <a:p>
             <a:endParaRPr lang="en-US" sz="1700" dirty="0" smtClean="0"/>
           </a:p>
           <a:p>
+            <a:endParaRPr lang="en-US" sz="1700" dirty="0" smtClean="0"/>
+          </a:p>
+          <a:p>
             <a:r>
               <a:rPr lang="en-US" sz="1700" dirty="0" smtClean="0"/>
-              <a:t>Maximizing </a:t>
-            </a:r>
+              <a:t>These decisions become more important when dealing with systems that can be life threatening or resource consuming.</a:t>
+            </a:r>
+          </a:p>
+          <a:p>
+            <a:endParaRPr lang="en-US" sz="1700" dirty="0" smtClean="0"/>
+          </a:p>
+          <a:p>
+            <a:endParaRPr lang="en-US" sz="1700" dirty="0" smtClean="0"/>
+          </a:p>
+          <a:p>
             <a:r>
               <a:rPr lang="en-US" sz="1700" dirty="0" smtClean="0"/>
-              <a:t>the output of any system requires plenty of study, which will yield effective procedures to design, develop, and maintain them. </a:t>
-            </a:r>
-            <a:endParaRPr lang="en-US" sz="1700" dirty="0" smtClean="0"/>
-          </a:p>
-          <a:p>
-            <a:endParaRPr lang="en-US" sz="1700" dirty="0" smtClean="0"/>
-          </a:p>
-          <a:p>
-            <a:endParaRPr lang="en-US" sz="1700" dirty="0" smtClean="0"/>
-          </a:p>
-          <a:p>
-            <a:r>
-              <a:rPr lang="en-US" sz="1700" dirty="0" smtClean="0"/>
-              <a:t>These </a:t>
-            </a:r>
-            <a:r>
-              <a:rPr lang="en-US" sz="1700" dirty="0" smtClean="0"/>
-              <a:t>decisions become more important when dealing with systems that can be life threatening or resource </a:t>
-            </a:r>
-            <a:r>
-              <a:rPr lang="en-US" sz="1700" dirty="0" smtClean="0"/>
-              <a:t>consuming.</a:t>
-            </a:r>
-          </a:p>
-          <a:p>
-            <a:endParaRPr lang="en-US" sz="1700" dirty="0" smtClean="0"/>
-          </a:p>
-          <a:p>
-            <a:endParaRPr lang="en-US" sz="1700" dirty="0" smtClean="0"/>
-          </a:p>
-          <a:p>
-            <a:r>
-              <a:rPr lang="en-US" sz="1700" dirty="0" smtClean="0"/>
-              <a:t>A </a:t>
-            </a:r>
-            <a:r>
-              <a:rPr lang="en-US" sz="1700" dirty="0" smtClean="0"/>
-              <a:t>decision of what to do if a bio-warfare every breaks out or how to correctly allocate energy resources in the dangers of global warming are good examples of these systems of study</a:t>
-            </a:r>
-            <a:r>
-              <a:rPr lang="en-US" sz="1700" dirty="0" smtClean="0"/>
-              <a:t>.</a:t>
+              <a:t>A decision of what to do if a bio-warfare every breaks out or how to correctly allocate energy resources in the dangers of global warming are good examples of these systems of study.</a:t>
             </a:r>
           </a:p>
           <a:p>
@@ -5161,6 +5397,13 @@
   <p:clrMapOvr>
     <a:masterClrMapping/>
   </p:clrMapOvr>
+  <p:timing>
+    <p:tnLst>
+      <p:par>
+        <p:cTn id="1" dur="indefinite" restart="never" nodeType="tmRoot"/>
+      </p:par>
+    </p:tnLst>
+  </p:timing>
 </p:sld>
 </file>
 
@@ -5200,11 +5443,7 @@
           <a:p>
             <a:r>
               <a:rPr lang="en-US" sz="1700" dirty="0" smtClean="0"/>
-              <a:t>Usually the studies of systems like bio-ware scenarios or global warming are unrealistic without the help of modern technology</a:t>
-            </a:r>
-            <a:r>
-              <a:rPr lang="en-US" sz="1700" dirty="0" smtClean="0"/>
-              <a:t>.</a:t>
+              <a:t>Usually the studies of systems like bio-ware scenarios or global warming are unrealistic without the help of modern technology.</a:t>
             </a:r>
           </a:p>
           <a:p>
@@ -5216,45 +5455,31 @@
           <a:p>
             <a:r>
               <a:rPr lang="en-US" sz="1600" dirty="0" smtClean="0"/>
-              <a:t>Analysis </a:t>
-            </a:r>
+              <a:t>Analysis requires millions of entities interacting over a long period of times to get valuable information on different decision paths. </a:t>
+            </a:r>
+          </a:p>
+          <a:p>
+            <a:endParaRPr lang="en-US" sz="1600" dirty="0" smtClean="0"/>
+          </a:p>
+          <a:p>
+            <a:endParaRPr lang="en-US" sz="1600" dirty="0" smtClean="0"/>
+          </a:p>
+          <a:p>
             <a:r>
               <a:rPr lang="en-US" sz="1600" dirty="0" smtClean="0"/>
-              <a:t>requires millions of entities interacting over a long period of times to get valuable information on different decision paths. </a:t>
-            </a:r>
+              <a:t>Computer-based simulations play a very important role analyzing and studying complex system as described above. </a:t>
+            </a:r>
+          </a:p>
+          <a:p>
             <a:endParaRPr lang="en-US" sz="1600" dirty="0" smtClean="0"/>
           </a:p>
           <a:p>
             <a:endParaRPr lang="en-US" sz="1600" dirty="0" smtClean="0"/>
           </a:p>
           <a:p>
-            <a:endParaRPr lang="en-US" sz="1600" dirty="0" smtClean="0"/>
-          </a:p>
-          <a:p>
             <a:r>
               <a:rPr lang="en-US" sz="1600" dirty="0" smtClean="0"/>
-              <a:t>Computer-based </a:t>
-            </a:r>
-            <a:r>
-              <a:rPr lang="en-US" sz="1600" dirty="0" smtClean="0"/>
-              <a:t>simulations play a very important role analyzing and studying complex system as described above. </a:t>
-            </a:r>
-            <a:endParaRPr lang="en-US" sz="1600" dirty="0" smtClean="0"/>
-          </a:p>
-          <a:p>
-            <a:endParaRPr lang="en-US" sz="1600" dirty="0" smtClean="0"/>
-          </a:p>
-          <a:p>
-            <a:endParaRPr lang="en-US" sz="1600" dirty="0" smtClean="0"/>
-          </a:p>
-          <a:p>
-            <a:r>
-              <a:rPr lang="en-US" sz="1600" dirty="0" smtClean="0"/>
-              <a:t>This </a:t>
-            </a:r>
-            <a:r>
-              <a:rPr lang="en-US" sz="1600" dirty="0" smtClean="0"/>
-              <a:t>is the main motivation behind the need to advance technology in computer-based simulations.</a:t>
+              <a:t>This is the main motivation behind the need to advance technology in computer-based simulations.</a:t>
             </a:r>
           </a:p>
           <a:p>
@@ -5294,6 +5519,13 @@
   <p:clrMapOvr>
     <a:masterClrMapping/>
   </p:clrMapOvr>
+  <p:timing>
+    <p:tnLst>
+      <p:par>
+        <p:cTn id="1" dur="indefinite" restart="never" nodeType="tmRoot"/>
+      </p:par>
+    </p:tnLst>
+  </p:timing>
 </p:sld>
 </file>
 
@@ -5366,7 +5598,21 @@
             </a:r>
             <a:r>
               <a:rPr lang="en-US" dirty="0" smtClean="0"/>
-              <a:t>nvironment</a:t>
+              <a:t>nvironment.</a:t>
+            </a:r>
+          </a:p>
+          <a:p>
+            <a:pPr lvl="1"/>
+            <a:r>
+              <a:rPr lang="en-US" dirty="0" smtClean="0"/>
+              <a:t>MUSE (verb): to become absorbed in thought.</a:t>
+            </a:r>
+          </a:p>
+          <a:p>
+            <a:pPr lvl="1"/>
+            <a:r>
+              <a:rPr lang="en-US" dirty="0" smtClean="0"/>
+              <a:t>An Agent-based Simulation Environment</a:t>
             </a:r>
             <a:r>
               <a:rPr lang="en-US" dirty="0" smtClean="0"/>
@@ -5374,38 +5620,10 @@
             </a:r>
           </a:p>
           <a:p>
-            <a:pPr lvl="1"/>
-            <a:r>
-              <a:rPr lang="en-US" dirty="0" smtClean="0"/>
-              <a:t>MUSE </a:t>
-            </a:r>
-            <a:r>
-              <a:rPr lang="en-US" dirty="0" smtClean="0"/>
-              <a:t>(verb): to become </a:t>
-            </a:r>
-            <a:r>
-              <a:rPr lang="en-US" dirty="0" smtClean="0"/>
-              <a:t>absorbed </a:t>
-            </a:r>
-            <a:r>
-              <a:rPr lang="en-US" dirty="0" smtClean="0"/>
-              <a:t>in </a:t>
-            </a:r>
-            <a:r>
-              <a:rPr lang="en-US" dirty="0" smtClean="0"/>
-              <a:t>thought.</a:t>
-            </a:r>
-          </a:p>
-          <a:p>
-            <a:pPr lvl="1"/>
-            <a:r>
-              <a:rPr lang="en-US" dirty="0" smtClean="0"/>
-              <a:t>An Agent-based Simulation Environment.</a:t>
-            </a:r>
-          </a:p>
-          <a:p>
-            <a:pPr lvl="1"/>
-            <a:endParaRPr lang="en-US" dirty="0"/>
+            <a:pPr lvl="1">
+              <a:buNone/>
+            </a:pPr>
+            <a:endParaRPr lang="en-US" dirty="0" smtClean="0"/>
           </a:p>
         </p:txBody>
       </p:sp>
@@ -5430,11 +5648,7 @@
             </a:r>
             <a:r>
               <a:rPr lang="en-US" sz="1200" dirty="0" smtClean="0"/>
-              <a:t>(3/3</a:t>
-            </a:r>
-            <a:r>
-              <a:rPr lang="en-US" sz="1200" dirty="0" smtClean="0"/>
-              <a:t>)</a:t>
+              <a:t>(3/3)</a:t>
             </a:r>
             <a:endParaRPr lang="en-US" dirty="0"/>
           </a:p>
@@ -5445,6 +5659,13 @@
   <p:clrMapOvr>
     <a:masterClrMapping/>
   </p:clrMapOvr>
+  <p:timing>
+    <p:tnLst>
+      <p:par>
+        <p:cTn id="1" dur="indefinite" restart="never" nodeType="tmRoot"/>
+      </p:par>
+    </p:tnLst>
+  </p:timing>
 </p:sld>
 </file>
 
@@ -5480,6 +5701,49 @@
           <a:bodyPr/>
           <a:lstStyle/>
           <a:p>
+            <a:r>
+              <a:rPr lang="en-US" sz="1700" dirty="0" smtClean="0"/>
+              <a:t>Simulation is mimicking a system.</a:t>
+            </a:r>
+          </a:p>
+          <a:p>
+            <a:endParaRPr lang="en-US" sz="1700" dirty="0" smtClean="0"/>
+          </a:p>
+          <a:p>
+            <a:r>
+              <a:rPr lang="en-US" sz="1700" dirty="0" smtClean="0"/>
+              <a:t>In </a:t>
+            </a:r>
+            <a:r>
+              <a:rPr lang="en-US" sz="1700" dirty="0" smtClean="0"/>
+              <a:t>agent-based modeling (ABM), a system is modeled as a collection of independent decision-making entities called agents (Bonabeau). </a:t>
+            </a:r>
+            <a:endParaRPr lang="en-US" sz="1700" dirty="0" smtClean="0"/>
+          </a:p>
+          <a:p>
+            <a:endParaRPr lang="en-US" sz="1700" dirty="0" smtClean="0"/>
+          </a:p>
+          <a:p>
+            <a:r>
+              <a:rPr lang="en-US" sz="1800" dirty="0" smtClean="0"/>
+              <a:t>Typically the agent has a set of rules to follow and based on these rules the agent can make decisions. </a:t>
+            </a:r>
+            <a:endParaRPr lang="en-US" sz="1800" dirty="0" smtClean="0"/>
+          </a:p>
+          <a:p>
+            <a:pPr lvl="1"/>
+            <a:r>
+              <a:rPr lang="en-US" sz="1300" dirty="0" smtClean="0"/>
+              <a:t>These rules are data that we collect and input into the model.</a:t>
+            </a:r>
+          </a:p>
+          <a:p>
+            <a:endParaRPr lang="en-US" sz="1700" dirty="0" smtClean="0"/>
+          </a:p>
+          <a:p>
+            <a:endParaRPr lang="en-US" sz="1700" dirty="0" smtClean="0"/>
+          </a:p>
+          <a:p>
             <a:endParaRPr lang="en-US" dirty="0"/>
           </a:p>
         </p:txBody>
@@ -5496,18 +5760,20 @@
         </p:nvSpPr>
         <p:spPr/>
         <p:txBody>
-          <a:bodyPr/>
+          <a:bodyPr>
+            <a:normAutofit/>
+          </a:bodyPr>
           <a:lstStyle/>
           <a:p>
             <a:r>
               <a:rPr lang="en-US" sz="3000" dirty="0" smtClean="0"/>
-              <a:t>Background and Related Works</a:t>
+              <a:t>Agent-based Modeling</a:t>
             </a:r>
             <a:r>
               <a:rPr lang="en-US" sz="1200" dirty="0" smtClean="0"/>
-              <a:t>(1/10)</a:t>
-            </a:r>
-            <a:endParaRPr lang="en-US" dirty="0"/>
+              <a:t>(1/1)</a:t>
+            </a:r>
+            <a:endParaRPr lang="en-US" sz="1200" dirty="0"/>
           </a:p>
         </p:txBody>
       </p:sp>
@@ -5516,6 +5782,13 @@
   <p:clrMapOvr>
     <a:masterClrMapping/>
   </p:clrMapOvr>
+  <p:timing>
+    <p:tnLst>
+      <p:par>
+        <p:cTn id="1" dur="indefinite" restart="never" nodeType="tmRoot"/>
+      </p:par>
+    </p:tnLst>
+  </p:timing>
 </p:sld>
 </file>
 
@@ -5551,36 +5824,112 @@
           <a:bodyPr/>
           <a:lstStyle/>
           <a:p>
+            <a:r>
+              <a:rPr lang="en-US" sz="1700" dirty="0" smtClean="0"/>
+              <a:t>The </a:t>
+            </a:r>
+            <a:r>
+              <a:rPr lang="en-US" sz="1700" dirty="0" smtClean="0"/>
+              <a:t>most important being ABM can capture emergent phenomena (Bonabeau). </a:t>
+            </a:r>
+            <a:endParaRPr lang="en-US" sz="1700" dirty="0" smtClean="0"/>
+          </a:p>
+          <a:p>
+            <a:pPr>
+              <a:buNone/>
+            </a:pPr>
+            <a:endParaRPr lang="en-US" sz="1700" dirty="0" smtClean="0"/>
+          </a:p>
+          <a:p>
+            <a:r>
+              <a:rPr lang="en-US" sz="1700" dirty="0" smtClean="0"/>
+              <a:t>How  can phenomena be captured?</a:t>
+            </a:r>
+          </a:p>
+          <a:p>
+            <a:pPr lvl="1"/>
+            <a:r>
+              <a:rPr lang="en-US" sz="1300" dirty="0" smtClean="0"/>
+              <a:t>Nothing is constant in this universe except change.</a:t>
+            </a:r>
+          </a:p>
+          <a:p>
+            <a:pPr lvl="1"/>
+            <a:r>
+              <a:rPr lang="en-US" sz="1300" dirty="0" smtClean="0"/>
+              <a:t>All entities are always changing is some way.</a:t>
+            </a:r>
+          </a:p>
+          <a:p>
+            <a:endParaRPr lang="en-US" sz="1700" dirty="0" smtClean="0"/>
+          </a:p>
+          <a:p>
+            <a:r>
+              <a:rPr lang="en-US" sz="1800" dirty="0" smtClean="0"/>
+              <a:t>“the whole is more than the sum of its part because of the interactions between the parts” (Bonabeau). </a:t>
+            </a:r>
+            <a:endParaRPr lang="en-US" sz="1700" dirty="0" smtClean="0"/>
+          </a:p>
+          <a:p>
+            <a:pPr lvl="1"/>
+            <a:endParaRPr lang="en-US" dirty="0" smtClean="0"/>
+          </a:p>
+          <a:p>
+            <a:r>
+              <a:rPr lang="en-US" sz="1700" dirty="0" smtClean="0"/>
+              <a:t>ABM is also flexible and more natural to work with </a:t>
+            </a:r>
+            <a:r>
+              <a:rPr lang="en-US" sz="1600" dirty="0" smtClean="0"/>
+              <a:t>(Bonabeau). </a:t>
+            </a:r>
+            <a:endParaRPr lang="en-US" sz="1600" dirty="0" smtClean="0"/>
+          </a:p>
+          <a:p>
+            <a:pPr lvl="1"/>
+            <a:r>
+              <a:rPr lang="en-US" sz="1300" dirty="0" smtClean="0"/>
+              <a:t>We can easily collect more data and add it to the model, making it flexible.</a:t>
+            </a:r>
+          </a:p>
+          <a:p>
+            <a:pPr lvl="1"/>
+            <a:r>
+              <a:rPr lang="en-US" sz="1300" dirty="0" smtClean="0"/>
+              <a:t>Easy to think of modeling as interaction between entities.</a:t>
+            </a:r>
+            <a:endParaRPr lang="en-US" sz="1300" dirty="0"/>
+          </a:p>
+        </p:txBody>
+      </p:sp>
+      <p:sp>
+        <p:nvSpPr>
+          <p:cNvPr id="3" name="Title 2"/>
+          <p:cNvSpPr>
+            <a:spLocks noGrp="1"/>
+          </p:cNvSpPr>
+          <p:nvPr>
+            <p:ph type="title"/>
+          </p:nvPr>
+        </p:nvSpPr>
+        <p:spPr/>
+        <p:txBody>
+          <a:bodyPr/>
+          <a:lstStyle/>
+          <a:p>
+            <a:r>
+              <a:rPr lang="en-US" sz="3000" dirty="0" smtClean="0"/>
+              <a:t>Advantages to ABM</a:t>
+            </a:r>
+            <a:r>
+              <a:rPr lang="en-US" sz="1800" dirty="0" smtClean="0"/>
+              <a:t>(1/1</a:t>
+            </a:r>
+            <a:r>
+              <a:rPr lang="en-US" sz="1800" dirty="0" smtClean="0"/>
+              <a:t>)</a:t>
+            </a:r>
             <a:endParaRPr lang="en-US" dirty="0"/>
-          </a:p>
-        </p:txBody>
-      </p:sp>
-      <p:sp>
-        <p:nvSpPr>
-          <p:cNvPr id="3" name="Title 2"/>
-          <p:cNvSpPr>
-            <a:spLocks noGrp="1"/>
-          </p:cNvSpPr>
-          <p:nvPr>
-            <p:ph type="title"/>
-          </p:nvPr>
-        </p:nvSpPr>
-        <p:spPr/>
-        <p:txBody>
-          <a:bodyPr>
-            <a:normAutofit/>
-          </a:bodyPr>
-          <a:lstStyle/>
-          <a:p>
-            <a:r>
-              <a:rPr lang="en-US" sz="3000" dirty="0" smtClean="0"/>
-              <a:t>MUSE Design Details</a:t>
-            </a:r>
-            <a:r>
-              <a:rPr lang="en-US" sz="1200" dirty="0" smtClean="0"/>
-              <a:t>(1/10)</a:t>
-            </a:r>
-            <a:endParaRPr lang="en-US" sz="3000" dirty="0"/>
           </a:p>
         </p:txBody>
       </p:sp>
@@ -5589,6 +5938,13 @@
   <p:clrMapOvr>
     <a:masterClrMapping/>
   </p:clrMapOvr>
+  <p:timing>
+    <p:tnLst>
+      <p:par>
+        <p:cTn id="1" dur="indefinite" restart="never" nodeType="tmRoot"/>
+      </p:par>
+    </p:tnLst>
+  </p:timing>
 </p:sld>
 </file>
 
@@ -5621,39 +5977,219 @@
         </p:nvSpPr>
         <p:spPr/>
         <p:txBody>
-          <a:bodyPr/>
-          <a:lstStyle/>
-          <a:p>
-            <a:endParaRPr lang="en-US" dirty="0"/>
-          </a:p>
-        </p:txBody>
-      </p:sp>
-      <p:sp>
-        <p:nvSpPr>
-          <p:cNvPr id="3" name="Title 2"/>
-          <p:cNvSpPr>
-            <a:spLocks noGrp="1"/>
-          </p:cNvSpPr>
-          <p:nvPr>
-            <p:ph type="title"/>
-          </p:nvPr>
-        </p:nvSpPr>
-        <p:spPr/>
-        <p:txBody>
           <a:bodyPr>
             <a:normAutofit/>
           </a:bodyPr>
           <a:lstStyle/>
           <a:p>
             <a:r>
+              <a:rPr lang="en-US" sz="1700" dirty="0" smtClean="0"/>
+              <a:t>For the experiments, implementation and testing is done with PHOLD (Fujimoto). </a:t>
+            </a:r>
+            <a:endParaRPr lang="en-US" sz="1700" dirty="0" smtClean="0"/>
+          </a:p>
+          <a:p>
+            <a:endParaRPr lang="en-US" sz="1700" dirty="0" smtClean="0"/>
+          </a:p>
+          <a:p>
+            <a:r>
+              <a:rPr lang="en-US" sz="1700" dirty="0" smtClean="0"/>
+              <a:t>PHOLD variables used to scale and fine tune a simulation workload.</a:t>
+            </a:r>
+          </a:p>
+          <a:p>
+            <a:pPr lvl="1"/>
+            <a:r>
+              <a:rPr lang="en-US" sz="1300" i="1" dirty="0" smtClean="0"/>
+              <a:t>X</a:t>
+            </a:r>
+            <a:r>
+              <a:rPr lang="en-US" sz="1300" dirty="0" smtClean="0"/>
+              <a:t>, this is the number of columns to have in the PHOLD grid</a:t>
+            </a:r>
+          </a:p>
+          <a:p>
+            <a:pPr lvl="1"/>
+            <a:r>
+              <a:rPr lang="en-US" sz="1300" i="1" dirty="0" smtClean="0"/>
+              <a:t>Y</a:t>
+            </a:r>
+            <a:r>
+              <a:rPr lang="en-US" sz="1300" dirty="0" smtClean="0"/>
+              <a:t>, this is the number of rows to have in the PHOLD grid</a:t>
+            </a:r>
+          </a:p>
+          <a:p>
+            <a:pPr lvl="1"/>
+            <a:r>
+              <a:rPr lang="en-US" sz="1300" i="1" dirty="0" smtClean="0"/>
+              <a:t>N</a:t>
+            </a:r>
+            <a:r>
+              <a:rPr lang="en-US" sz="1300" dirty="0" smtClean="0"/>
+              <a:t>, the number of events each agent sends every time.</a:t>
+            </a:r>
+          </a:p>
+          <a:p>
+            <a:pPr lvl="1"/>
+            <a:r>
+              <a:rPr lang="en-US" sz="1300" i="1" dirty="0" smtClean="0"/>
+              <a:t>Delay</a:t>
+            </a:r>
+            <a:r>
+              <a:rPr lang="en-US" sz="1300" dirty="0" smtClean="0"/>
+              <a:t>, the maximum receive time that an agent can schedule an event for.</a:t>
+            </a:r>
+          </a:p>
+          <a:p>
+            <a:pPr lvl="1"/>
+            <a:r>
+              <a:rPr lang="en-US" sz="1300" i="1" dirty="0" smtClean="0"/>
+              <a:t>Nodes</a:t>
+            </a:r>
+            <a:r>
+              <a:rPr lang="en-US" sz="1300" dirty="0" smtClean="0"/>
+              <a:t>, the number of compute nodes to use for the PHOLD simulation.</a:t>
+            </a:r>
+            <a:endParaRPr lang="en-US" sz="1300" dirty="0"/>
+          </a:p>
+        </p:txBody>
+      </p:sp>
+      <p:sp>
+        <p:nvSpPr>
+          <p:cNvPr id="3" name="Title 2"/>
+          <p:cNvSpPr>
+            <a:spLocks noGrp="1"/>
+          </p:cNvSpPr>
+          <p:nvPr>
+            <p:ph type="title"/>
+          </p:nvPr>
+        </p:nvSpPr>
+        <p:spPr/>
+        <p:txBody>
+          <a:bodyPr/>
+          <a:lstStyle/>
+          <a:p>
+            <a:r>
               <a:rPr lang="en-US" sz="3000" dirty="0" smtClean="0"/>
-              <a:t>MUSE Public API</a:t>
-            </a:r>
-            <a:r>
-              <a:rPr lang="en-US" sz="1200" dirty="0" smtClean="0"/>
+              <a:t>Empirical </a:t>
+            </a:r>
+            <a:r>
+              <a:rPr lang="en-US" sz="3000" dirty="0" smtClean="0"/>
+              <a:t>Evaluation and Benchmarking</a:t>
+            </a:r>
+            <a:r>
+              <a:rPr lang="en-US" sz="1800" dirty="0" smtClean="0"/>
               <a:t>(1/10)</a:t>
             </a:r>
-            <a:endParaRPr lang="en-US" sz="3000" dirty="0"/>
+            <a:endParaRPr lang="en-US" dirty="0"/>
+          </a:p>
+        </p:txBody>
+      </p:sp>
+      <p:pic>
+        <p:nvPicPr>
+          <p:cNvPr id="4" name="Picture 3"/>
+          <p:cNvPicPr/>
+          <p:nvPr/>
+        </p:nvPicPr>
+        <p:blipFill>
+          <a:blip r:embed="rId2"/>
+          <a:srcRect/>
+          <a:stretch>
+            <a:fillRect/>
+          </a:stretch>
+        </p:blipFill>
+        <p:spPr bwMode="auto">
+          <a:xfrm>
+            <a:off x="3048000" y="4038600"/>
+            <a:ext cx="4902574" cy="2190750"/>
+          </a:xfrm>
+          <a:prstGeom prst="rect">
+            <a:avLst/>
+          </a:prstGeom>
+          <a:noFill/>
+          <a:ln w="9525">
+            <a:noFill/>
+            <a:miter lim="800000"/>
+            <a:headEnd/>
+            <a:tailEnd/>
+          </a:ln>
+        </p:spPr>
+      </p:pic>
+      <p:sp>
+        <p:nvSpPr>
+          <p:cNvPr id="6145" name="Rectangle 1"/>
+          <p:cNvSpPr>
+            <a:spLocks noChangeArrowheads="1"/>
+          </p:cNvSpPr>
+          <p:nvPr/>
+        </p:nvSpPr>
+        <p:spPr bwMode="auto">
+          <a:xfrm>
+            <a:off x="3352800" y="6248400"/>
+            <a:ext cx="4648200" cy="261610"/>
+          </a:xfrm>
+          <a:prstGeom prst="rect">
+            <a:avLst/>
+          </a:prstGeom>
+          <a:noFill/>
+          <a:ln w="9525">
+            <a:noFill/>
+            <a:miter lim="800000"/>
+            <a:headEnd/>
+            <a:tailEnd/>
+          </a:ln>
+          <a:effectLst/>
+        </p:spPr>
+        <p:txBody>
+          <a:bodyPr vert="horz" wrap="square" lIns="91440" tIns="45720" rIns="91440" bIns="45720" numCol="1" anchor="ctr" anchorCtr="0" compatLnSpc="1">
+            <a:prstTxWarp prst="textNoShape">
+              <a:avLst/>
+            </a:prstTxWarp>
+            <a:spAutoFit/>
+          </a:bodyPr>
+          <a:lstStyle/>
+          <a:p>
+            <a:pPr marL="0" marR="0" lvl="0" indent="0" defTabSz="914400" rtl="0" eaLnBrk="1" fontAlgn="base" latinLnBrk="0" hangingPunct="1">
+              <a:lnSpc>
+                <a:spcPct val="100000"/>
+              </a:lnSpc>
+              <a:spcBef>
+                <a:spcPct val="0"/>
+              </a:spcBef>
+              <a:spcAft>
+                <a:spcPct val="0"/>
+              </a:spcAft>
+              <a:buClrTx/>
+              <a:buSzTx/>
+              <a:buFontTx/>
+              <a:buNone/>
+              <a:tabLst/>
+            </a:pPr>
+            <a:r>
+              <a:rPr kumimoji="0" lang="en-US" sz="1100" b="1" i="0" u="none" strike="noStrike" cap="none" normalizeH="0" baseline="0" dirty="0" smtClean="0" bmk="_Toc229989871">
+                <a:ln>
+                  <a:noFill/>
+                </a:ln>
+                <a:solidFill>
+                  <a:srgbClr val="4F81BD"/>
+                </a:solidFill>
+                <a:effectLst/>
+                <a:latin typeface="Arial" pitchFamily="34" charset="0"/>
+                <a:ea typeface="Times New Roman" pitchFamily="18" charset="0"/>
+              </a:rPr>
+              <a:t> 3 x 3 PHOLD simulations on three compute nodes</a:t>
+            </a:r>
+            <a:endParaRPr kumimoji="0" lang="en-US" sz="1800" b="0" i="0" u="none" strike="noStrike" cap="none" normalizeH="0" baseline="0" dirty="0" smtClean="0">
+              <a:ln>
+                <a:noFill/>
+              </a:ln>
+              <a:solidFill>
+                <a:schemeClr val="tx1"/>
+              </a:solidFill>
+              <a:effectLst/>
+              <a:latin typeface="Arial" pitchFamily="34" charset="0"/>
+            </a:endParaRPr>
           </a:p>
         </p:txBody>
       </p:sp>
@@ -5662,6 +6198,13 @@
   <p:clrMapOvr>
     <a:masterClrMapping/>
   </p:clrMapOvr>
+  <p:timing>
+    <p:tnLst>
+      <p:par>
+        <p:cTn id="1" dur="indefinite" restart="never" nodeType="tmRoot"/>
+      </p:par>
+    </p:tnLst>
+  </p:timing>
 </p:sld>
 </file>
 
@@ -5694,35 +6237,49 @@
         </p:nvSpPr>
         <p:spPr/>
         <p:txBody>
+          <a:bodyPr>
+            <a:normAutofit/>
+          </a:bodyPr>
+          <a:lstStyle/>
+          <a:p>
+            <a:endParaRPr lang="en-US" sz="1300" dirty="0"/>
+          </a:p>
+        </p:txBody>
+      </p:sp>
+      <p:sp>
+        <p:nvSpPr>
+          <p:cNvPr id="3" name="Title 2"/>
+          <p:cNvSpPr>
+            <a:spLocks noGrp="1"/>
+          </p:cNvSpPr>
+          <p:nvPr>
+            <p:ph type="title"/>
+          </p:nvPr>
+        </p:nvSpPr>
+        <p:spPr/>
+        <p:txBody>
           <a:bodyPr/>
           <a:lstStyle/>
           <a:p>
-            <a:endParaRPr lang="en-US" dirty="0"/>
-          </a:p>
-        </p:txBody>
-      </p:sp>
-      <p:sp>
-        <p:nvSpPr>
-          <p:cNvPr id="3" name="Title 2"/>
-          <p:cNvSpPr>
-            <a:spLocks noGrp="1"/>
-          </p:cNvSpPr>
-          <p:nvPr>
-            <p:ph type="title"/>
-          </p:nvPr>
-        </p:nvSpPr>
-        <p:spPr/>
-        <p:txBody>
-          <a:bodyPr/>
-          <a:lstStyle/>
-          <a:p>
             <a:r>
               <a:rPr lang="en-US" sz="3000" dirty="0" smtClean="0"/>
-              <a:t>Empirical Evaluation and Benchmarking</a:t>
+              <a:t>Empirical </a:t>
+            </a:r>
+            <a:r>
+              <a:rPr lang="en-US" sz="3000" dirty="0" smtClean="0"/>
+              <a:t>Evaluation and </a:t>
+            </a:r>
+            <a:r>
+              <a:rPr lang="en-US" sz="3000" dirty="0" smtClean="0"/>
+              <a:t>Benchmarking</a:t>
             </a:r>
             <a:r>
               <a:rPr lang="en-US" sz="1800" dirty="0" smtClean="0"/>
-              <a:t>(1/10)</a:t>
+              <a:t>(2/10</a:t>
+            </a:r>
+            <a:r>
+              <a:rPr lang="en-US" sz="1800" dirty="0" smtClean="0"/>
+              <a:t>)</a:t>
             </a:r>
             <a:endParaRPr lang="en-US" dirty="0"/>
           </a:p>
@@ -5733,6 +6290,13 @@
   <p:clrMapOvr>
     <a:masterClrMapping/>
   </p:clrMapOvr>
+  <p:timing>
+    <p:tnLst>
+      <p:par>
+        <p:cTn id="1" dur="indefinite" restart="never" nodeType="tmRoot"/>
+      </p:par>
+    </p:tnLst>
+  </p:timing>
 </p:sld>
 </file>
 

</xml_diff>